<commit_message>
Flowchart Update for Rock Paper Scissors Game
Updated to include the conditions if a player wins more than half of the
total games.
</commit_message>
<xml_diff>
--- a/Rock, Paper, Scissors Game Loop Flowchart.pptx
+++ b/Rock, Paper, Scissors Game Loop Flowchart.pptx
@@ -3111,7 +3111,7 @@
         </p:nvSpPr>
         <p:spPr>
           <a:xfrm>
-            <a:off x="228600" y="685800"/>
+            <a:off x="152400" y="304800"/>
             <a:ext cx="1143000" cy="381000"/>
           </a:xfrm>
           <a:prstGeom prst="ellipse">
@@ -3371,15 +3371,15 @@
         <p:nvCxnSpPr>
           <p:cNvPr id="13" name="Straight Arrow Connector 12"/>
           <p:cNvCxnSpPr>
-            <a:stCxn id="5" idx="6"/>
+            <a:stCxn id="5" idx="4"/>
             <a:endCxn id="268" idx="5"/>
           </p:cNvCxnSpPr>
           <p:nvPr/>
         </p:nvCxnSpPr>
         <p:spPr>
           <a:xfrm>
-            <a:off x="1371600" y="876300"/>
-            <a:ext cx="438150" cy="114300"/>
+            <a:off x="723900" y="685800"/>
+            <a:ext cx="323850" cy="381000"/>
           </a:xfrm>
           <a:prstGeom prst="straightConnector1">
             <a:avLst/>
@@ -4507,19 +4507,7 @@
             <a:pPr algn="ctr"/>
             <a:r>
               <a:rPr lang="en-US" sz="1200" dirty="0" smtClean="0"/>
-              <a:t>You </a:t>
-            </a:r>
-            <a:r>
-              <a:rPr lang="en-US" sz="1200" dirty="0" smtClean="0"/>
-              <a:t>win  </a:t>
-            </a:r>
-            <a:r>
-              <a:rPr lang="en-US" sz="1200" dirty="0" smtClean="0"/>
-              <a:t>Win</a:t>
-            </a:r>
-            <a:r>
-              <a:rPr lang="en-US" sz="1200" dirty="0" smtClean="0"/>
-              <a:t> + 1</a:t>
+              <a:t>You win  Win + 1</a:t>
             </a:r>
             <a:endParaRPr lang="en-US" sz="1200" dirty="0"/>
           </a:p>
@@ -4612,11 +4600,7 @@
             <a:pPr algn="ctr"/>
             <a:r>
               <a:rPr lang="en-US" sz="1200" dirty="0" smtClean="0"/>
-              <a:t>CPU </a:t>
-            </a:r>
-            <a:r>
-              <a:rPr lang="en-US" sz="1200" dirty="0" smtClean="0"/>
-              <a:t>wins Win + 1</a:t>
+              <a:t>CPU wins Win + 1</a:t>
             </a:r>
             <a:endParaRPr lang="en-US" sz="1200" dirty="0"/>
           </a:p>
@@ -5388,19 +5372,18 @@
           <p:cNvPr id="464" name="Shape 463"/>
           <p:cNvCxnSpPr>
             <a:stCxn id="193" idx="1"/>
-            <a:endCxn id="287" idx="2"/>
+            <a:endCxn id="111" idx="1"/>
           </p:cNvCxnSpPr>
           <p:nvPr/>
         </p:nvCxnSpPr>
         <p:spPr>
           <a:xfrm rot="10800000" flipH="1">
-            <a:off x="2133600" y="1752600"/>
-            <a:ext cx="4381500" cy="1943100"/>
-          </a:xfrm>
-          <a:prstGeom prst="bentConnector4">
+            <a:off x="2133600" y="2552700"/>
+            <a:ext cx="762000" cy="1143000"/>
+          </a:xfrm>
+          <a:prstGeom prst="bentConnector3">
             <a:avLst>
-              <a:gd name="adj1" fmla="val -5217"/>
-              <a:gd name="adj2" fmla="val 69652"/>
+              <a:gd name="adj1" fmla="val -30000"/>
             </a:avLst>
           </a:prstGeom>
           <a:ln>
@@ -5427,19 +5410,18 @@
           <p:cNvPr id="476" name="Shape 475"/>
           <p:cNvCxnSpPr>
             <a:stCxn id="195" idx="1"/>
-            <a:endCxn id="287" idx="2"/>
+            <a:endCxn id="111" idx="1"/>
           </p:cNvCxnSpPr>
           <p:nvPr/>
         </p:nvCxnSpPr>
         <p:spPr>
           <a:xfrm rot="10800000" flipH="1">
-            <a:off x="2133600" y="1752600"/>
-            <a:ext cx="4381500" cy="3086100"/>
-          </a:xfrm>
-          <a:prstGeom prst="bentConnector4">
+            <a:off x="2133600" y="2552700"/>
+            <a:ext cx="762000" cy="2286000"/>
+          </a:xfrm>
+          <a:prstGeom prst="bentConnector3">
             <a:avLst>
-              <a:gd name="adj1" fmla="val -5217"/>
-              <a:gd name="adj2" fmla="val 81389"/>
+              <a:gd name="adj1" fmla="val -30000"/>
             </a:avLst>
           </a:prstGeom>
           <a:ln>
@@ -5466,19 +5448,18 @@
           <p:cNvPr id="478" name="Shape 477"/>
           <p:cNvCxnSpPr>
             <a:stCxn id="194" idx="1"/>
-            <a:endCxn id="287" idx="2"/>
+            <a:endCxn id="111" idx="1"/>
           </p:cNvCxnSpPr>
           <p:nvPr/>
         </p:nvCxnSpPr>
         <p:spPr>
           <a:xfrm rot="10800000" flipH="1">
-            <a:off x="2133600" y="1752600"/>
-            <a:ext cx="4381500" cy="4305300"/>
-          </a:xfrm>
-          <a:prstGeom prst="bentConnector4">
+            <a:off x="2133600" y="2552700"/>
+            <a:ext cx="762000" cy="3505200"/>
+          </a:xfrm>
+          <a:prstGeom prst="bentConnector3">
             <a:avLst>
-              <a:gd name="adj1" fmla="val -5217"/>
-              <a:gd name="adj2" fmla="val 86448"/>
+              <a:gd name="adj1" fmla="val -30000"/>
             </a:avLst>
           </a:prstGeom>
           <a:ln>
@@ -5544,7 +5525,7 @@
         </p:nvSpPr>
         <p:spPr>
           <a:xfrm>
-            <a:off x="1752600" y="762000"/>
+            <a:off x="990600" y="838200"/>
             <a:ext cx="1676400" cy="457200"/>
           </a:xfrm>
           <a:prstGeom prst="parallelogram">
@@ -5588,7 +5569,7 @@
         </p:nvSpPr>
         <p:spPr>
           <a:xfrm>
-            <a:off x="3886200" y="762000"/>
+            <a:off x="2895600" y="838200"/>
             <a:ext cx="1447800" cy="457200"/>
           </a:xfrm>
           <a:prstGeom prst="rect">
@@ -5618,7 +5599,11 @@
             <a:pPr algn="ctr"/>
             <a:r>
               <a:rPr lang="en-US" sz="1200" dirty="0" smtClean="0"/>
-              <a:t>Store game amount into  games.</a:t>
+              <a:t>Store game amount into  games</a:t>
+            </a:r>
+            <a:r>
+              <a:rPr lang="en-US" sz="1200" dirty="0" smtClean="0"/>
+              <a:t>. </a:t>
             </a:r>
             <a:endParaRPr lang="en-US" sz="1200" dirty="0"/>
           </a:p>
@@ -6159,8 +6144,8 @@
         </p:nvCxnSpPr>
         <p:spPr>
           <a:xfrm>
-            <a:off x="3371850" y="990600"/>
-            <a:ext cx="514350" cy="0"/>
+            <a:off x="2609850" y="1066800"/>
+            <a:ext cx="285750" cy="0"/>
           </a:xfrm>
           <a:prstGeom prst="straightConnector1">
             <a:avLst/>
@@ -6189,14 +6174,14 @@
           <p:cNvPr id="474" name="Straight Arrow Connector 473"/>
           <p:cNvCxnSpPr>
             <a:stCxn id="283" idx="3"/>
-            <a:endCxn id="287" idx="0"/>
+            <a:endCxn id="136" idx="1"/>
           </p:cNvCxnSpPr>
           <p:nvPr/>
         </p:nvCxnSpPr>
         <p:spPr>
-          <a:xfrm>
-            <a:off x="5334000" y="990600"/>
-            <a:ext cx="1181100" cy="152400"/>
+          <a:xfrm flipV="1">
+            <a:off x="4343400" y="990600"/>
+            <a:ext cx="381000" cy="76200"/>
           </a:xfrm>
           <a:prstGeom prst="straightConnector1">
             <a:avLst/>
@@ -6244,11 +6229,7 @@
           <a:p>
             <a:r>
               <a:rPr lang="en-US" sz="1200" dirty="0" smtClean="0"/>
-              <a:t>i</a:t>
-            </a:r>
-            <a:r>
-              <a:rPr lang="en-US" sz="1200" dirty="0" smtClean="0"/>
-              <a:t> != games</a:t>
+              <a:t>i != games</a:t>
             </a:r>
             <a:endParaRPr lang="en-US" sz="1200" dirty="0"/>
           </a:p>
@@ -6453,11 +6434,7 @@
             <a:pPr algn="ctr"/>
             <a:r>
               <a:rPr lang="en-US" sz="1200" dirty="0" smtClean="0"/>
-              <a:t>You </a:t>
-            </a:r>
-            <a:r>
-              <a:rPr lang="en-US" sz="1200" dirty="0" smtClean="0"/>
-              <a:t>win</a:t>
+              <a:t>You win</a:t>
             </a:r>
             <a:endParaRPr lang="en-US" sz="1200" dirty="0"/>
           </a:p>
@@ -6550,11 +6527,7 @@
             <a:pPr algn="ctr"/>
             <a:r>
               <a:rPr lang="en-US" sz="1200" dirty="0" smtClean="0"/>
-              <a:t>CPU </a:t>
-            </a:r>
-            <a:r>
-              <a:rPr lang="en-US" sz="1200" dirty="0" smtClean="0"/>
-              <a:t>wins</a:t>
+              <a:t>CPU wins</a:t>
             </a:r>
             <a:endParaRPr lang="en-US" sz="1200" dirty="0"/>
           </a:p>
@@ -6897,6 +6870,266 @@
             <a:r>
               <a:rPr lang="en-US" sz="1200" dirty="0" smtClean="0"/>
               <a:t>You = CPU</a:t>
+            </a:r>
+            <a:endParaRPr lang="en-US" sz="1200" dirty="0"/>
+          </a:p>
+        </p:txBody>
+      </p:sp>
+      <p:sp>
+        <p:nvSpPr>
+          <p:cNvPr id="111" name="Diamond 110"/>
+          <p:cNvSpPr/>
+          <p:nvPr/>
+        </p:nvSpPr>
+        <p:spPr>
+          <a:xfrm>
+            <a:off x="2895600" y="2286000"/>
+            <a:ext cx="2895600" cy="533400"/>
+          </a:xfrm>
+          <a:prstGeom prst="diamond">
+            <a:avLst/>
+          </a:prstGeom>
+        </p:spPr>
+        <p:style>
+          <a:lnRef idx="2">
+            <a:schemeClr val="accent1">
+              <a:shade val="50000"/>
+            </a:schemeClr>
+          </a:lnRef>
+          <a:fillRef idx="1">
+            <a:schemeClr val="accent1"/>
+          </a:fillRef>
+          <a:effectRef idx="0">
+            <a:schemeClr val="accent1"/>
+          </a:effectRef>
+          <a:fontRef idx="minor">
+            <a:schemeClr val="lt1"/>
+          </a:fontRef>
+        </p:style>
+        <p:txBody>
+          <a:bodyPr rtlCol="0" anchor="ctr"/>
+          <a:lstStyle/>
+          <a:p>
+            <a:pPr algn="ctr"/>
+            <a:r>
+              <a:rPr lang="en-US" sz="1200" dirty="0" smtClean="0"/>
+              <a:t>Your win &gt; mean or CPU win &gt; mean</a:t>
+            </a:r>
+            <a:endParaRPr lang="en-US" sz="1200" dirty="0"/>
+          </a:p>
+        </p:txBody>
+      </p:sp>
+      <p:cxnSp>
+        <p:nvCxnSpPr>
+          <p:cNvPr id="122" name="Straight Arrow Connector 121"/>
+          <p:cNvCxnSpPr>
+            <a:stCxn id="111" idx="0"/>
+            <a:endCxn id="497" idx="2"/>
+          </p:cNvCxnSpPr>
+          <p:nvPr/>
+        </p:nvCxnSpPr>
+        <p:spPr>
+          <a:xfrm flipH="1" flipV="1">
+            <a:off x="3619500" y="1905000"/>
+            <a:ext cx="723900" cy="381000"/>
+          </a:xfrm>
+          <a:prstGeom prst="straightConnector1">
+            <a:avLst/>
+          </a:prstGeom>
+          <a:ln>
+            <a:tailEnd type="arrow"/>
+          </a:ln>
+        </p:spPr>
+        <p:style>
+          <a:lnRef idx="1">
+            <a:schemeClr val="accent1"/>
+          </a:lnRef>
+          <a:fillRef idx="0">
+            <a:schemeClr val="accent1"/>
+          </a:fillRef>
+          <a:effectRef idx="0">
+            <a:schemeClr val="accent1"/>
+          </a:effectRef>
+          <a:fontRef idx="minor">
+            <a:schemeClr val="tx1"/>
+          </a:fontRef>
+        </p:style>
+      </p:cxnSp>
+      <p:cxnSp>
+        <p:nvCxnSpPr>
+          <p:cNvPr id="124" name="Straight Arrow Connector 123"/>
+          <p:cNvCxnSpPr>
+            <a:stCxn id="111" idx="3"/>
+            <a:endCxn id="287" idx="2"/>
+          </p:cNvCxnSpPr>
+          <p:nvPr/>
+        </p:nvCxnSpPr>
+        <p:spPr>
+          <a:xfrm flipV="1">
+            <a:off x="5791200" y="1752600"/>
+            <a:ext cx="723900" cy="800100"/>
+          </a:xfrm>
+          <a:prstGeom prst="straightConnector1">
+            <a:avLst/>
+          </a:prstGeom>
+          <a:ln>
+            <a:tailEnd type="arrow"/>
+          </a:ln>
+        </p:spPr>
+        <p:style>
+          <a:lnRef idx="1">
+            <a:schemeClr val="accent1"/>
+          </a:lnRef>
+          <a:fillRef idx="0">
+            <a:schemeClr val="accent1"/>
+          </a:fillRef>
+          <a:effectRef idx="0">
+            <a:schemeClr val="accent1"/>
+          </a:effectRef>
+          <a:fontRef idx="minor">
+            <a:schemeClr val="tx1"/>
+          </a:fontRef>
+        </p:style>
+      </p:cxnSp>
+      <p:sp>
+        <p:nvSpPr>
+          <p:cNvPr id="125" name="TextBox 124"/>
+          <p:cNvSpPr txBox="1"/>
+          <p:nvPr/>
+        </p:nvSpPr>
+        <p:spPr>
+          <a:xfrm>
+            <a:off x="3854792" y="2085201"/>
+            <a:ext cx="260008" cy="276999"/>
+          </a:xfrm>
+          <a:prstGeom prst="rect">
+            <a:avLst/>
+          </a:prstGeom>
+          <a:noFill/>
+        </p:spPr>
+        <p:txBody>
+          <a:bodyPr wrap="none" rtlCol="0">
+            <a:spAutoFit/>
+          </a:bodyPr>
+          <a:lstStyle/>
+          <a:p>
+            <a:r>
+              <a:rPr lang="en-US" sz="1200" dirty="0" smtClean="0"/>
+              <a:t>Y</a:t>
+            </a:r>
+            <a:endParaRPr lang="en-US" sz="1200" dirty="0"/>
+          </a:p>
+        </p:txBody>
+      </p:sp>
+      <p:sp>
+        <p:nvSpPr>
+          <p:cNvPr id="136" name="Rectangle 135"/>
+          <p:cNvSpPr/>
+          <p:nvPr/>
+        </p:nvSpPr>
+        <p:spPr>
+          <a:xfrm>
+            <a:off x="4724400" y="762000"/>
+            <a:ext cx="1295400" cy="457200"/>
+          </a:xfrm>
+          <a:prstGeom prst="rect">
+            <a:avLst/>
+          </a:prstGeom>
+        </p:spPr>
+        <p:style>
+          <a:lnRef idx="2">
+            <a:schemeClr val="accent1">
+              <a:shade val="50000"/>
+            </a:schemeClr>
+          </a:lnRef>
+          <a:fillRef idx="1">
+            <a:schemeClr val="accent1"/>
+          </a:fillRef>
+          <a:effectRef idx="0">
+            <a:schemeClr val="accent1"/>
+          </a:effectRef>
+          <a:fontRef idx="minor">
+            <a:schemeClr val="lt1"/>
+          </a:fontRef>
+        </p:style>
+        <p:txBody>
+          <a:bodyPr rtlCol="0" anchor="ctr"/>
+          <a:lstStyle/>
+          <a:p>
+            <a:pPr algn="ctr"/>
+            <a:r>
+              <a:rPr lang="en-US" sz="1200" dirty="0" smtClean="0"/>
+              <a:t>Store game </a:t>
+            </a:r>
+            <a:r>
+              <a:rPr lang="en-US" sz="1200" dirty="0" smtClean="0"/>
+              <a:t>mean into mean.</a:t>
+            </a:r>
+            <a:endParaRPr lang="en-US" sz="1200" dirty="0"/>
+          </a:p>
+        </p:txBody>
+      </p:sp>
+      <p:cxnSp>
+        <p:nvCxnSpPr>
+          <p:cNvPr id="154" name="Straight Arrow Connector 153"/>
+          <p:cNvCxnSpPr>
+            <a:stCxn id="136" idx="3"/>
+            <a:endCxn id="287" idx="0"/>
+          </p:cNvCxnSpPr>
+          <p:nvPr/>
+        </p:nvCxnSpPr>
+        <p:spPr>
+          <a:xfrm>
+            <a:off x="6019800" y="990600"/>
+            <a:ext cx="495300" cy="152400"/>
+          </a:xfrm>
+          <a:prstGeom prst="straightConnector1">
+            <a:avLst/>
+          </a:prstGeom>
+          <a:ln>
+            <a:tailEnd type="arrow"/>
+          </a:ln>
+        </p:spPr>
+        <p:style>
+          <a:lnRef idx="1">
+            <a:schemeClr val="accent1"/>
+          </a:lnRef>
+          <a:fillRef idx="0">
+            <a:schemeClr val="accent1"/>
+          </a:fillRef>
+          <a:effectRef idx="0">
+            <a:schemeClr val="accent1"/>
+          </a:effectRef>
+          <a:fontRef idx="minor">
+            <a:schemeClr val="tx1"/>
+          </a:fontRef>
+        </p:style>
+      </p:cxnSp>
+      <p:sp>
+        <p:nvSpPr>
+          <p:cNvPr id="162" name="TextBox 161"/>
+          <p:cNvSpPr txBox="1"/>
+          <p:nvPr/>
+        </p:nvSpPr>
+        <p:spPr>
+          <a:xfrm>
+            <a:off x="5888148" y="2009001"/>
+            <a:ext cx="284052" cy="276999"/>
+          </a:xfrm>
+          <a:prstGeom prst="rect">
+            <a:avLst/>
+          </a:prstGeom>
+          <a:noFill/>
+        </p:spPr>
+        <p:txBody>
+          <a:bodyPr wrap="none" rtlCol="0">
+            <a:spAutoFit/>
+          </a:bodyPr>
+          <a:lstStyle/>
+          <a:p>
+            <a:r>
+              <a:rPr lang="en-US" sz="1200" dirty="0" smtClean="0"/>
+              <a:t>N</a:t>
             </a:r>
             <a:endParaRPr lang="en-US" sz="1200" dirty="0"/>
           </a:p>

</xml_diff>